<commit_message>
changes to Sprint Review 2 Power point
Made changes to update tasks completed and burndown chart
</commit_message>
<xml_diff>
--- a/Documents/SprintReview2.pptx
+++ b/Documents/SprintReview2.pptx
@@ -109,6 +109,22 @@
       </a:defRPr>
     </a:lvl9pPr>
   </p:defaultTextStyle>
+  <p:extLst>
+    <p:ext uri="{EFAFB233-063F-42B5-8137-9DF3F51BA10A}">
+      <p15:sldGuideLst xmlns:p15="http://schemas.microsoft.com/office/powerpoint/2012/main">
+        <p15:guide id="1" orient="horz" pos="2160">
+          <p15:clr>
+            <a:srgbClr val="A4A3A4"/>
+          </p15:clr>
+        </p15:guide>
+        <p15:guide id="2" pos="2880">
+          <p15:clr>
+            <a:srgbClr val="A4A3A4"/>
+          </p15:clr>
+        </p15:guide>
+      </p15:sldGuideLst>
+    </p:ext>
+  </p:extLst>
 </p:presentation>
 </file>
 
@@ -163,46 +179,46 @@
                 <c:formatCode>d\-mmm</c:formatCode>
                 <c:ptCount val="14"/>
                 <c:pt idx="0">
-                  <c:v>41921.0</c:v>
+                  <c:v>41921</c:v>
                 </c:pt>
                 <c:pt idx="1">
-                  <c:v>41922.0</c:v>
+                  <c:v>41922</c:v>
                 </c:pt>
                 <c:pt idx="2">
-                  <c:v>41923.0</c:v>
+                  <c:v>41923</c:v>
                 </c:pt>
                 <c:pt idx="3">
-                  <c:v>41924.0</c:v>
+                  <c:v>41924</c:v>
                 </c:pt>
                 <c:pt idx="4">
-                  <c:v>41925.0</c:v>
+                  <c:v>41925</c:v>
                 </c:pt>
                 <c:pt idx="5">
-                  <c:v>41926.0</c:v>
+                  <c:v>41926</c:v>
                 </c:pt>
                 <c:pt idx="6">
-                  <c:v>41927.0</c:v>
+                  <c:v>41927</c:v>
                 </c:pt>
                 <c:pt idx="7">
-                  <c:v>41928.0</c:v>
+                  <c:v>41928</c:v>
                 </c:pt>
                 <c:pt idx="8">
-                  <c:v>41929.0</c:v>
+                  <c:v>41929</c:v>
                 </c:pt>
                 <c:pt idx="9">
-                  <c:v>41930.0</c:v>
+                  <c:v>41930</c:v>
                 </c:pt>
                 <c:pt idx="10">
-                  <c:v>41931.0</c:v>
+                  <c:v>41931</c:v>
                 </c:pt>
                 <c:pt idx="11">
-                  <c:v>41932.0</c:v>
+                  <c:v>41932</c:v>
                 </c:pt>
                 <c:pt idx="12">
-                  <c:v>41933.0</c:v>
+                  <c:v>41933</c:v>
                 </c:pt>
                 <c:pt idx="13">
-                  <c:v>41934.0</c:v>
+                  <c:v>41934</c:v>
                 </c:pt>
               </c:numCache>
             </c:numRef>
@@ -214,46 +230,46 @@
                 <c:formatCode>General</c:formatCode>
                 <c:ptCount val="14"/>
                 <c:pt idx="0">
-                  <c:v>33.0</c:v>
+                  <c:v>33</c:v>
                 </c:pt>
                 <c:pt idx="1">
-                  <c:v>31.0</c:v>
+                  <c:v>31</c:v>
                 </c:pt>
                 <c:pt idx="2">
-                  <c:v>31.0</c:v>
+                  <c:v>31</c:v>
                 </c:pt>
                 <c:pt idx="3">
-                  <c:v>28.0</c:v>
+                  <c:v>28</c:v>
                 </c:pt>
                 <c:pt idx="4">
-                  <c:v>26.0</c:v>
+                  <c:v>26</c:v>
                 </c:pt>
                 <c:pt idx="5">
-                  <c:v>26.0</c:v>
+                  <c:v>26</c:v>
                 </c:pt>
                 <c:pt idx="6">
-                  <c:v>21.0</c:v>
+                  <c:v>21</c:v>
                 </c:pt>
                 <c:pt idx="7">
-                  <c:v>21.0</c:v>
+                  <c:v>21</c:v>
                 </c:pt>
                 <c:pt idx="8">
-                  <c:v>21.0</c:v>
+                  <c:v>21</c:v>
                 </c:pt>
                 <c:pt idx="9">
-                  <c:v>20.0</c:v>
+                  <c:v>20</c:v>
                 </c:pt>
                 <c:pt idx="10">
-                  <c:v>20.0</c:v>
+                  <c:v>20</c:v>
                 </c:pt>
                 <c:pt idx="11">
-                  <c:v>18.0</c:v>
+                  <c:v>18</c:v>
                 </c:pt>
                 <c:pt idx="12">
-                  <c:v>18.0</c:v>
+                  <c:v>16</c:v>
                 </c:pt>
                 <c:pt idx="13">
-                  <c:v>18.0</c:v>
+                  <c:v>11</c:v>
                 </c:pt>
               </c:numCache>
             </c:numRef>
@@ -292,46 +308,46 @@
                 <c:formatCode>d\-mmm</c:formatCode>
                 <c:ptCount val="14"/>
                 <c:pt idx="0">
-                  <c:v>41921.0</c:v>
+                  <c:v>41921</c:v>
                 </c:pt>
                 <c:pt idx="1">
-                  <c:v>41922.0</c:v>
+                  <c:v>41922</c:v>
                 </c:pt>
                 <c:pt idx="2">
-                  <c:v>41923.0</c:v>
+                  <c:v>41923</c:v>
                 </c:pt>
                 <c:pt idx="3">
-                  <c:v>41924.0</c:v>
+                  <c:v>41924</c:v>
                 </c:pt>
                 <c:pt idx="4">
-                  <c:v>41925.0</c:v>
+                  <c:v>41925</c:v>
                 </c:pt>
                 <c:pt idx="5">
-                  <c:v>41926.0</c:v>
+                  <c:v>41926</c:v>
                 </c:pt>
                 <c:pt idx="6">
-                  <c:v>41927.0</c:v>
+                  <c:v>41927</c:v>
                 </c:pt>
                 <c:pt idx="7">
-                  <c:v>41928.0</c:v>
+                  <c:v>41928</c:v>
                 </c:pt>
                 <c:pt idx="8">
-                  <c:v>41929.0</c:v>
+                  <c:v>41929</c:v>
                 </c:pt>
                 <c:pt idx="9">
-                  <c:v>41930.0</c:v>
+                  <c:v>41930</c:v>
                 </c:pt>
                 <c:pt idx="10">
-                  <c:v>41931.0</c:v>
+                  <c:v>41931</c:v>
                 </c:pt>
                 <c:pt idx="11">
-                  <c:v>41932.0</c:v>
+                  <c:v>41932</c:v>
                 </c:pt>
                 <c:pt idx="12">
-                  <c:v>41933.0</c:v>
+                  <c:v>41933</c:v>
                 </c:pt>
                 <c:pt idx="13">
-                  <c:v>41934.0</c:v>
+                  <c:v>41934</c:v>
                 </c:pt>
               </c:numCache>
             </c:numRef>
@@ -343,46 +359,46 @@
                 <c:formatCode>General</c:formatCode>
                 <c:ptCount val="14"/>
                 <c:pt idx="0">
-                  <c:v>30.64285714285714</c:v>
+                  <c:v>30.642857142857142</c:v>
                 </c:pt>
                 <c:pt idx="1">
-                  <c:v>28.28571428571428</c:v>
+                  <c:v>28.285714285714285</c:v>
                 </c:pt>
                 <c:pt idx="2">
-                  <c:v>25.92857142857143</c:v>
+                  <c:v>25.928571428571431</c:v>
                 </c:pt>
                 <c:pt idx="3">
-                  <c:v>23.57142857142857</c:v>
+                  <c:v>23.571428571428569</c:v>
                 </c:pt>
                 <c:pt idx="4">
-                  <c:v>21.21428571428571</c:v>
+                  <c:v>21.214285714285715</c:v>
                 </c:pt>
                 <c:pt idx="5">
-                  <c:v>18.85714285714286</c:v>
+                  <c:v>18.857142857142858</c:v>
                 </c:pt>
                 <c:pt idx="6">
                   <c:v>16.5</c:v>
                 </c:pt>
                 <c:pt idx="7">
-                  <c:v>14.14285714285714</c:v>
+                  <c:v>14.142857142857142</c:v>
                 </c:pt>
                 <c:pt idx="8">
-                  <c:v>11.78571428571428</c:v>
+                  <c:v>11.785714285714285</c:v>
                 </c:pt>
                 <c:pt idx="9">
                   <c:v>9.428571428571427</c:v>
                 </c:pt>
                 <c:pt idx="10">
-                  <c:v>7.07142857142857</c:v>
+                  <c:v>7.0714285714285694</c:v>
                 </c:pt>
                 <c:pt idx="11">
-                  <c:v>4.714285714285715</c:v>
+                  <c:v>4.7142857142857153</c:v>
                 </c:pt>
                 <c:pt idx="12">
-                  <c:v>2.357142857142858</c:v>
+                  <c:v>2.3571428571428577</c:v>
                 </c:pt>
                 <c:pt idx="13">
-                  <c:v>0.0</c:v>
+                  <c:v>0</c:v>
                 </c:pt>
               </c:numCache>
             </c:numRef>
@@ -397,13 +413,12 @@
           <c:showPercent val="0"/>
           <c:showBubbleSize val="0"/>
         </c:dLbls>
-        <c:marker val="1"/>
         <c:smooth val="0"/>
-        <c:axId val="2099663000"/>
-        <c:axId val="2099666088"/>
+        <c:axId val="415866656"/>
+        <c:axId val="415870968"/>
       </c:lineChart>
       <c:dateAx>
-        <c:axId val="2099663000"/>
+        <c:axId val="415866656"/>
         <c:scaling>
           <c:orientation val="minMax"/>
         </c:scaling>
@@ -413,14 +428,14 @@
         <c:majorTickMark val="out"/>
         <c:minorTickMark val="none"/>
         <c:tickLblPos val="nextTo"/>
-        <c:crossAx val="2099666088"/>
+        <c:crossAx val="415870968"/>
         <c:crosses val="autoZero"/>
         <c:auto val="1"/>
         <c:lblOffset val="100"/>
         <c:baseTimeUnit val="days"/>
       </c:dateAx>
       <c:valAx>
-        <c:axId val="2099666088"/>
+        <c:axId val="415870968"/>
         <c:scaling>
           <c:orientation val="minMax"/>
         </c:scaling>
@@ -431,7 +446,7 @@
         <c:majorTickMark val="out"/>
         <c:minorTickMark val="none"/>
         <c:tickLblPos val="nextTo"/>
-        <c:crossAx val="2099663000"/>
+        <c:crossAx val="415866656"/>
         <c:crosses val="autoZero"/>
         <c:crossBetween val="between"/>
       </c:valAx>
@@ -699,7 +714,7 @@
           <a:p>
             <a:fld id="{D7C3A134-F1C3-464B-BF47-54DC2DE08F52}" type="datetimeFigureOut">
               <a:rPr lang="en-US" smtClean="0"/>
-              <a:t>10/21/14</a:t>
+              <a:t>10/22/2014</a:t>
             </a:fld>
             <a:endParaRPr lang="en-US"/>
           </a:p>
@@ -922,7 +937,7 @@
           <a:p>
             <a:fld id="{D7C3A134-F1C3-464B-BF47-54DC2DE08F52}" type="datetimeFigureOut">
               <a:rPr lang="en-US" smtClean="0"/>
-              <a:t>10/21/14</a:t>
+              <a:t>10/22/2014</a:t>
             </a:fld>
             <a:endParaRPr lang="en-US"/>
           </a:p>
@@ -1202,7 +1217,7 @@
           <a:p>
             <a:fld id="{D7C3A134-F1C3-464B-BF47-54DC2DE08F52}" type="datetimeFigureOut">
               <a:rPr lang="en-US" smtClean="0"/>
-              <a:t>10/21/14</a:t>
+              <a:t>10/22/2014</a:t>
             </a:fld>
             <a:endParaRPr lang="en-US"/>
           </a:p>
@@ -1381,7 +1396,7 @@
           <a:p>
             <a:fld id="{D7C3A134-F1C3-464B-BF47-54DC2DE08F52}" type="datetimeFigureOut">
               <a:rPr lang="en-US" smtClean="0"/>
-              <a:t>10/21/14</a:t>
+              <a:t>10/22/2014</a:t>
             </a:fld>
             <a:endParaRPr lang="en-US"/>
           </a:p>
@@ -1739,7 +1754,7 @@
           <a:p>
             <a:fld id="{D7C3A134-F1C3-464B-BF47-54DC2DE08F52}" type="datetimeFigureOut">
               <a:rPr lang="en-US" smtClean="0"/>
-              <a:t>10/21/14</a:t>
+              <a:t>10/22/2014</a:t>
             </a:fld>
             <a:endParaRPr lang="en-US"/>
           </a:p>
@@ -2026,7 +2041,7 @@
           <a:p>
             <a:fld id="{D7C3A134-F1C3-464B-BF47-54DC2DE08F52}" type="datetimeFigureOut">
               <a:rPr lang="en-US" smtClean="0"/>
-              <a:t>10/21/14</a:t>
+              <a:t>10/22/2014</a:t>
             </a:fld>
             <a:endParaRPr lang="en-US"/>
           </a:p>
@@ -2448,7 +2463,7 @@
           <a:p>
             <a:fld id="{D7C3A134-F1C3-464B-BF47-54DC2DE08F52}" type="datetimeFigureOut">
               <a:rPr lang="en-US" smtClean="0"/>
-              <a:t>10/21/14</a:t>
+              <a:t>10/22/2014</a:t>
             </a:fld>
             <a:endParaRPr lang="en-US"/>
           </a:p>
@@ -2563,7 +2578,7 @@
           <a:p>
             <a:fld id="{D7C3A134-F1C3-464B-BF47-54DC2DE08F52}" type="datetimeFigureOut">
               <a:rPr lang="en-US" smtClean="0"/>
-              <a:t>10/21/14</a:t>
+              <a:t>10/22/2014</a:t>
             </a:fld>
             <a:endParaRPr lang="en-US"/>
           </a:p>
@@ -2653,7 +2668,7 @@
           <a:p>
             <a:fld id="{D7C3A134-F1C3-464B-BF47-54DC2DE08F52}" type="datetimeFigureOut">
               <a:rPr lang="en-US" smtClean="0"/>
-              <a:t>10/21/14</a:t>
+              <a:t>10/22/2014</a:t>
             </a:fld>
             <a:endParaRPr lang="en-US"/>
           </a:p>
@@ -2931,7 +2946,7 @@
           <a:p>
             <a:fld id="{D7C3A134-F1C3-464B-BF47-54DC2DE08F52}" type="datetimeFigureOut">
               <a:rPr lang="en-US" smtClean="0"/>
-              <a:t>10/21/14</a:t>
+              <a:t>10/22/2014</a:t>
             </a:fld>
             <a:endParaRPr lang="en-US"/>
           </a:p>
@@ -3297,7 +3312,7 @@
           <a:p>
             <a:fld id="{D7C3A134-F1C3-464B-BF47-54DC2DE08F52}" type="datetimeFigureOut">
               <a:rPr lang="en-US" smtClean="0"/>
-              <a:t>10/21/14</a:t>
+              <a:t>10/22/2014</a:t>
             </a:fld>
             <a:endParaRPr lang="en-US" dirty="0"/>
           </a:p>
@@ -3734,7 +3749,7 @@
           <a:p>
             <a:fld id="{D7C3A134-F1C3-464B-BF47-54DC2DE08F52}" type="datetimeFigureOut">
               <a:rPr lang="en-US" smtClean="0"/>
-              <a:t>10/21/14</a:t>
+              <a:t>10/22/2014</a:t>
             </a:fld>
             <a:endParaRPr lang="en-US" dirty="0"/>
           </a:p>
@@ -4157,11 +4172,7 @@
           <a:p>
             <a:r>
               <a:rPr lang="en-US" dirty="0" smtClean="0"/>
-              <a:t>Sprint </a:t>
-            </a:r>
-            <a:r>
-              <a:rPr lang="en-US" dirty="0" smtClean="0"/>
-              <a:t>Review 2</a:t>
+              <a:t>Sprint Review 2</a:t>
             </a:r>
             <a:endParaRPr lang="en-US" dirty="0"/>
           </a:p>
@@ -4275,7 +4286,7 @@
         </p:nvGraphicFramePr>
         <p:xfrm>
           <a:off x="582083" y="1608672"/>
-          <a:ext cx="8104717" cy="3865099"/>
+          <a:ext cx="8104717" cy="3865100"/>
         </p:xfrm>
         <a:graphic>
           <a:graphicData uri="http://schemas.openxmlformats.org/drawingml/2006/table">
@@ -6050,7 +6061,7 @@
           <p:nvPr>
             <p:extLst>
               <p:ext uri="{D42A27DB-BD31-4B8C-83A1-F6EECF244321}">
-                <p14:modId xmlns:p14="http://schemas.microsoft.com/office/powerpoint/2010/main" val="1400844210"/>
+                <p14:modId xmlns:p14="http://schemas.microsoft.com/office/powerpoint/2010/main" val="3763353234"/>
               </p:ext>
             </p:extLst>
           </p:nvPr>
@@ -6351,6 +6362,16 @@
                         <a:defRPr/>
                       </a:pPr>
                       <a:r>
+                        <a:rPr lang="en-US" sz="1000" b="0" i="0" u="none" strike="noStrike" dirty="0" err="1" smtClean="0">
+                          <a:solidFill>
+                            <a:srgbClr val="000000"/>
+                          </a:solidFill>
+                          <a:effectLst/>
+                          <a:latin typeface="Calibri"/>
+                        </a:rPr>
+                        <a:t>Testbed</a:t>
+                      </a:r>
+                      <a:r>
                         <a:rPr lang="en-US" sz="1000" b="0" i="0" u="none" strike="noStrike" dirty="0" smtClean="0">
                           <a:solidFill>
                             <a:srgbClr val="000000"/>
@@ -6358,27 +6379,8 @@
                           <a:effectLst/>
                           <a:latin typeface="Calibri"/>
                         </a:rPr>
-                        <a:t>Smart House web UI</a:t>
-                      </a:r>
-                    </a:p>
-                    <a:p>
-                      <a:pPr marL="171450" marR="0" indent="-171450" algn="l" defTabSz="914400" rtl="0" eaLnBrk="1" fontAlgn="b" latinLnBrk="0" hangingPunct="1">
-                        <a:lnSpc>
-                          <a:spcPct val="100000"/>
-                        </a:lnSpc>
-                        <a:spcBef>
-                          <a:spcPts val="0"/>
-                        </a:spcBef>
-                        <a:spcAft>
-                          <a:spcPts val="0"/>
-                        </a:spcAft>
-                        <a:buClrTx/>
-                        <a:buSzTx/>
-                        <a:buFont typeface="Arial"/>
-                        <a:buChar char="•"/>
-                        <a:tabLst/>
-                        <a:defRPr/>
-                      </a:pPr>
+                        <a:t> </a:t>
+                      </a:r>
                       <a:r>
                         <a:rPr lang="en-US" sz="1000" b="0" i="0" u="none" strike="noStrike" dirty="0" smtClean="0">
                           <a:solidFill>
@@ -6387,7 +6389,7 @@
                           <a:effectLst/>
                           <a:latin typeface="Calibri"/>
                         </a:rPr>
-                        <a:t>Testbed web UI</a:t>
+                        <a:t>web UI</a:t>
                       </a:r>
                     </a:p>
                     <a:p>
@@ -6418,6 +6420,49 @@
                     <a:bodyPr/>
                     <a:lstStyle/>
                     <a:p>
+                      <a:pPr marL="171450" marR="0" indent="-171450" algn="l" defTabSz="914400" rtl="0" eaLnBrk="1" fontAlgn="b" latinLnBrk="0" hangingPunct="1">
+                        <a:lnSpc>
+                          <a:spcPct val="100000"/>
+                        </a:lnSpc>
+                        <a:spcBef>
+                          <a:spcPts val="0"/>
+                        </a:spcBef>
+                        <a:spcAft>
+                          <a:spcPts val="0"/>
+                        </a:spcAft>
+                        <a:buClrTx/>
+                        <a:buSzTx/>
+                        <a:buFont typeface="Arial"/>
+                        <a:buChar char="•"/>
+                        <a:tabLst/>
+                        <a:defRPr/>
+                      </a:pPr>
+                      <a:r>
+                        <a:rPr kumimoji="0" lang="en-US" sz="1000" b="0" i="0" u="none" strike="noStrike" kern="1200" dirty="0">
+                          <a:solidFill>
+                            <a:srgbClr val="000000"/>
+                          </a:solidFill>
+                          <a:effectLst/>
+                          <a:latin typeface="Calibri"/>
+                          <a:ea typeface="+mn-ea"/>
+                          <a:cs typeface="+mn-cs"/>
+                        </a:rPr>
+                        <a:t> </a:t>
+                      </a:r>
+                      <a:r>
+                        <a:rPr kumimoji="0" lang="en-US" sz="1000" b="0" i="0" u="none" strike="noStrike" kern="1200" dirty="0" smtClean="0">
+                          <a:solidFill>
+                            <a:srgbClr val="000000"/>
+                          </a:solidFill>
+                          <a:effectLst/>
+                          <a:latin typeface="Calibri"/>
+                          <a:ea typeface="+mn-ea"/>
+                          <a:cs typeface="+mn-cs"/>
+                        </a:rPr>
+                        <a:t>Smart House web UI</a:t>
+                      </a:r>
+                    </a:p>
+                    <a:p>
                       <a:pPr algn="l" fontAlgn="b">
                         <a:lnSpc>
                           <a:spcPct val="100000"/>
@@ -6429,16 +6474,13 @@
                           <a:spcPts val="0"/>
                         </a:spcAft>
                       </a:pPr>
-                      <a:r>
-                        <a:rPr lang="en-US" sz="1000" b="1" i="0" u="none" strike="noStrike">
-                          <a:solidFill>
-                            <a:srgbClr val="FFFFFF"/>
-                          </a:solidFill>
-                          <a:effectLst/>
-                          <a:latin typeface="Calibri"/>
-                        </a:rPr>
-                        <a:t> </a:t>
-                      </a:r>
+                      <a:endParaRPr lang="en-US" sz="1000" b="1" i="0" u="none" strike="noStrike" dirty="0">
+                        <a:solidFill>
+                          <a:srgbClr val="FFFFFF"/>
+                        </a:solidFill>
+                        <a:effectLst/>
+                        <a:latin typeface="Calibri"/>
+                      </a:endParaRPr>
                     </a:p>
                   </a:txBody>
                   <a:tcPr marL="12700" marR="12700" marT="12700" marB="0" anchor="ctr"/>
@@ -7165,108 +7207,13 @@
                         <a:tabLst/>
                         <a:defRPr/>
                       </a:pPr>
-                      <a:r>
-                        <a:rPr lang="en-US" sz="1000" b="0" i="0" u="none" strike="noStrike" dirty="0" smtClean="0">
-                          <a:solidFill>
-                            <a:srgbClr val="000000"/>
-                          </a:solidFill>
-                          <a:effectLst/>
-                          <a:latin typeface="Calibri"/>
-                        </a:rPr>
-                        <a:t>Sprinkler web UI</a:t>
-                      </a:r>
-                    </a:p>
-                  </a:txBody>
-                  <a:tcPr marL="12700" marR="12700" marT="12700" marB="0" anchor="ctr"/>
-                </a:tc>
-                <a:tc>
-                  <a:txBody>
-                    <a:bodyPr/>
-                    <a:lstStyle/>
-                    <a:p>
-                      <a:pPr algn="l" fontAlgn="b">
-                        <a:lnSpc>
-                          <a:spcPct val="100000"/>
-                        </a:lnSpc>
-                        <a:spcBef>
-                          <a:spcPts val="0"/>
-                        </a:spcBef>
-                        <a:spcAft>
-                          <a:spcPts val="0"/>
-                        </a:spcAft>
-                      </a:pPr>
-                      <a:r>
-                        <a:rPr lang="en-US" sz="1000" b="1" i="0" u="none" strike="noStrike" dirty="0">
-                          <a:solidFill>
-                            <a:srgbClr val="FFFFFF"/>
-                          </a:solidFill>
-                          <a:effectLst/>
-                          <a:latin typeface="Calibri"/>
-                        </a:rPr>
-                        <a:t> </a:t>
-                      </a:r>
-                    </a:p>
-                  </a:txBody>
-                  <a:tcPr marL="12700" marR="12700" marT="12700" marB="0" anchor="ctr"/>
-                </a:tc>
-              </a:tr>
-              <a:tr h="499356">
-                <a:tc>
-                  <a:txBody>
-                    <a:bodyPr/>
-                    <a:lstStyle/>
-                    <a:p>
-                      <a:pPr algn="ctr" fontAlgn="ctr">
-                        <a:lnSpc>
-                          <a:spcPct val="100000"/>
-                        </a:lnSpc>
-                        <a:spcBef>
-                          <a:spcPts val="0"/>
-                        </a:spcBef>
-                        <a:spcAft>
-                          <a:spcPts val="0"/>
-                        </a:spcAft>
-                      </a:pPr>
-                      <a:r>
-                        <a:rPr lang="en-US" sz="1000" b="0" i="0" u="none" strike="noStrike" dirty="0">
-                          <a:solidFill>
-                            <a:schemeClr val="tx1"/>
-                          </a:solidFill>
-                          <a:effectLst/>
-                          <a:latin typeface="Calibri"/>
-                        </a:rPr>
-                        <a:t>US-09</a:t>
-                      </a:r>
-                    </a:p>
-                  </a:txBody>
-                  <a:tcPr marL="12700" marR="12700" marT="12700" marB="0" anchor="ctr"/>
-                </a:tc>
-                <a:tc>
-                  <a:txBody>
-                    <a:bodyPr/>
-                    <a:lstStyle/>
-                    <a:p>
-                      <a:pPr algn="ctr" fontAlgn="ctr">
-                        <a:lnSpc>
-                          <a:spcPct val="100000"/>
-                        </a:lnSpc>
-                        <a:spcBef>
-                          <a:spcPts val="0"/>
-                        </a:spcBef>
-                        <a:spcAft>
-                          <a:spcPts val="0"/>
-                        </a:spcAft>
-                      </a:pPr>
-                      <a:r>
-                        <a:rPr lang="en-US" sz="1000" b="0" i="0" u="none" strike="noStrike" dirty="0">
-                          <a:solidFill>
-                            <a:schemeClr val="tx1"/>
-                          </a:solidFill>
-                          <a:effectLst/>
-                          <a:latin typeface="Calibri"/>
-                        </a:rPr>
-                        <a:t>As an User I want to be able to control HVAC settings to control house temperature through the SHAS system</a:t>
-                      </a:r>
+                      <a:endParaRPr lang="en-US" sz="1000" b="0" i="0" u="none" strike="noStrike" dirty="0" smtClean="0">
+                        <a:solidFill>
+                          <a:srgbClr val="000000"/>
+                        </a:solidFill>
+                        <a:effectLst/>
+                        <a:latin typeface="Calibri"/>
+                      </a:endParaRPr>
                     </a:p>
                   </a:txBody>
                   <a:tcPr marL="12700" marR="12700" marT="12700" marB="0" anchor="ctr"/>
@@ -7294,14 +7241,108 @@
                         <a:defRPr/>
                       </a:pPr>
                       <a:r>
-                        <a:rPr lang="en-US" sz="1000" b="0" i="0" u="none" strike="noStrike" dirty="0" smtClean="0">
-                          <a:solidFill>
-                            <a:srgbClr val="000000"/>
-                          </a:solidFill>
-                          <a:effectLst/>
-                          <a:latin typeface="Calibri"/>
-                        </a:rPr>
-                        <a:t>Thermostat web UI</a:t>
+                        <a:rPr lang="en-US" sz="1000" b="1" i="0" u="none" strike="noStrike" dirty="0">
+                          <a:solidFill>
+                            <a:srgbClr val="FFFFFF"/>
+                          </a:solidFill>
+                          <a:effectLst/>
+                          <a:latin typeface="Calibri"/>
+                        </a:rPr>
+                        <a:t> </a:t>
+                      </a:r>
+                      <a:r>
+                        <a:rPr kumimoji="0" lang="en-US" sz="1000" b="0" i="0" u="none" strike="noStrike" kern="1200" dirty="0" smtClean="0">
+                          <a:solidFill>
+                            <a:srgbClr val="000000"/>
+                          </a:solidFill>
+                          <a:effectLst/>
+                          <a:latin typeface="Calibri"/>
+                          <a:ea typeface="+mn-ea"/>
+                          <a:cs typeface="+mn-cs"/>
+                        </a:rPr>
+                        <a:t>Sprinkler web UI</a:t>
+                      </a:r>
+                    </a:p>
+                    <a:p>
+                      <a:pPr algn="l" fontAlgn="b">
+                        <a:lnSpc>
+                          <a:spcPct val="100000"/>
+                        </a:lnSpc>
+                        <a:spcBef>
+                          <a:spcPts val="0"/>
+                        </a:spcBef>
+                        <a:spcAft>
+                          <a:spcPts val="0"/>
+                        </a:spcAft>
+                      </a:pPr>
+                      <a:endParaRPr lang="en-US" sz="1000" b="1" i="0" u="none" strike="noStrike" dirty="0">
+                        <a:solidFill>
+                          <a:srgbClr val="FFFFFF"/>
+                        </a:solidFill>
+                        <a:effectLst/>
+                        <a:latin typeface="Calibri"/>
+                      </a:endParaRPr>
+                    </a:p>
+                  </a:txBody>
+                  <a:tcPr marL="12700" marR="12700" marT="12700" marB="0" anchor="ctr"/>
+                </a:tc>
+              </a:tr>
+              <a:tr h="499356">
+                <a:tc>
+                  <a:txBody>
+                    <a:bodyPr/>
+                    <a:lstStyle/>
+                    <a:p>
+                      <a:pPr algn="ctr" fontAlgn="ctr">
+                        <a:lnSpc>
+                          <a:spcPct val="100000"/>
+                        </a:lnSpc>
+                        <a:spcBef>
+                          <a:spcPts val="0"/>
+                        </a:spcBef>
+                        <a:spcAft>
+                          <a:spcPts val="0"/>
+                        </a:spcAft>
+                      </a:pPr>
+                      <a:r>
+                        <a:rPr lang="en-US" sz="1000" b="0" i="0" u="none" strike="noStrike" dirty="0">
+                          <a:solidFill>
+                            <a:schemeClr val="tx1"/>
+                          </a:solidFill>
+                          <a:effectLst/>
+                          <a:latin typeface="Calibri"/>
+                        </a:rPr>
+                        <a:t>US-09</a:t>
+                      </a:r>
+                    </a:p>
+                  </a:txBody>
+                  <a:tcPr marL="12700" marR="12700" marT="12700" marB="0" anchor="ctr"/>
+                </a:tc>
+                <a:tc>
+                  <a:txBody>
+                    <a:bodyPr/>
+                    <a:lstStyle/>
+                    <a:p>
+                      <a:pPr algn="ctr" fontAlgn="ctr">
+                        <a:lnSpc>
+                          <a:spcPct val="100000"/>
+                        </a:lnSpc>
+                        <a:spcBef>
+                          <a:spcPts val="0"/>
+                        </a:spcBef>
+                        <a:spcAft>
+                          <a:spcPts val="0"/>
+                        </a:spcAft>
+                      </a:pPr>
+                      <a:r>
+                        <a:rPr lang="en-US" sz="1000" b="0" i="0" u="none" strike="noStrike" dirty="0">
+                          <a:solidFill>
+                            <a:schemeClr val="tx1"/>
+                          </a:solidFill>
+                          <a:effectLst/>
+                          <a:latin typeface="Calibri"/>
+                        </a:rPr>
+                        <a:t>As an User I want to be able to control HVAC settings to control house temperature through the SHAS system</a:t>
                       </a:r>
                     </a:p>
                   </a:txBody>
@@ -7329,6 +7370,39 @@
                         <a:tabLst/>
                         <a:defRPr/>
                       </a:pPr>
+                      <a:endParaRPr lang="en-US" sz="1000" b="0" i="0" u="none" strike="noStrike" dirty="0" smtClean="0">
+                        <a:solidFill>
+                          <a:srgbClr val="000000"/>
+                        </a:solidFill>
+                        <a:effectLst/>
+                        <a:latin typeface="Calibri"/>
+                      </a:endParaRPr>
+                    </a:p>
+                  </a:txBody>
+                  <a:tcPr marL="12700" marR="12700" marT="12700" marB="0" anchor="ctr"/>
+                </a:tc>
+                <a:tc>
+                  <a:txBody>
+                    <a:bodyPr/>
+                    <a:lstStyle/>
+                    <a:p>
+                      <a:pPr marL="171450" marR="0" indent="-171450" algn="l" defTabSz="914400" rtl="0" eaLnBrk="1" fontAlgn="b" latinLnBrk="0" hangingPunct="1">
+                        <a:lnSpc>
+                          <a:spcPct val="100000"/>
+                        </a:lnSpc>
+                        <a:spcBef>
+                          <a:spcPts val="0"/>
+                        </a:spcBef>
+                        <a:spcAft>
+                          <a:spcPts val="0"/>
+                        </a:spcAft>
+                        <a:buClrTx/>
+                        <a:buSzTx/>
+                        <a:buFont typeface="Arial"/>
+                        <a:buChar char="•"/>
+                        <a:tabLst/>
+                        <a:defRPr/>
+                      </a:pPr>
                       <a:r>
                         <a:rPr lang="en-US" sz="1000" b="0" i="0" u="none" strike="noStrike" dirty="0" smtClean="0">
                           <a:solidFill>
@@ -7347,6 +7421,47 @@
                   <a:txBody>
                     <a:bodyPr/>
                     <a:lstStyle/>
+                    <a:p>
+                      <a:pPr marL="171450" marR="0" indent="-171450" algn="l" defTabSz="914400" rtl="0" eaLnBrk="1" fontAlgn="b" latinLnBrk="0" hangingPunct="1">
+                        <a:lnSpc>
+                          <a:spcPct val="100000"/>
+                        </a:lnSpc>
+                        <a:spcBef>
+                          <a:spcPts val="0"/>
+                        </a:spcBef>
+                        <a:spcAft>
+                          <a:spcPts val="0"/>
+                        </a:spcAft>
+                        <a:buClrTx/>
+                        <a:buSzTx/>
+                        <a:buFont typeface="Arial"/>
+                        <a:buChar char="•"/>
+                        <a:tabLst/>
+                        <a:defRPr/>
+                      </a:pPr>
+                      <a:r>
+                        <a:rPr lang="en-US" sz="1000" b="1" i="0" u="none" strike="noStrike" dirty="0">
+                          <a:solidFill>
+                            <a:srgbClr val="FFFFFF"/>
+                          </a:solidFill>
+                          <a:effectLst/>
+                          <a:latin typeface="Calibri"/>
+                        </a:rPr>
+                        <a:t> </a:t>
+                      </a:r>
+                      <a:r>
+                        <a:rPr kumimoji="0" lang="en-US" sz="1000" b="0" i="0" u="none" strike="noStrike" kern="1200" dirty="0" smtClean="0">
+                          <a:solidFill>
+                            <a:srgbClr val="000000"/>
+                          </a:solidFill>
+                          <a:effectLst/>
+                          <a:latin typeface="Calibri"/>
+                          <a:ea typeface="+mn-ea"/>
+                          <a:cs typeface="+mn-cs"/>
+                        </a:rPr>
+                        <a:t>Thermostat web UI</a:t>
+                      </a:r>
+                    </a:p>
                     <a:p>
                       <a:pPr algn="l" fontAlgn="b">
                         <a:lnSpc>
@@ -7359,16 +7474,13 @@
                           <a:spcPts val="0"/>
                         </a:spcAft>
                       </a:pPr>
-                      <a:r>
-                        <a:rPr lang="en-US" sz="1000" b="1" i="0" u="none" strike="noStrike" dirty="0">
-                          <a:solidFill>
-                            <a:srgbClr val="FFFFFF"/>
-                          </a:solidFill>
-                          <a:effectLst/>
-                          <a:latin typeface="Calibri"/>
-                        </a:rPr>
-                        <a:t> </a:t>
-                      </a:r>
+                      <a:endParaRPr lang="en-US" sz="1000" b="1" i="0" u="none" strike="noStrike" dirty="0">
+                        <a:solidFill>
+                          <a:srgbClr val="FFFFFF"/>
+                        </a:solidFill>
+                        <a:effectLst/>
+                        <a:latin typeface="Calibri"/>
+                      </a:endParaRPr>
                     </a:p>
                   </a:txBody>
                   <a:tcPr marL="12700" marR="12700" marT="12700" marB="0" anchor="ctr"/>
@@ -7640,7 +7752,7 @@
           <p:nvPr>
             <p:extLst>
               <p:ext uri="{D42A27DB-BD31-4B8C-83A1-F6EECF244321}">
-                <p14:modId xmlns:p14="http://schemas.microsoft.com/office/powerpoint/2010/main" val="3984476716"/>
+                <p14:modId xmlns:p14="http://schemas.microsoft.com/office/powerpoint/2010/main" val="1748435737"/>
               </p:ext>
             </p:extLst>
           </p:nvPr>

</xml_diff>